<commit_message>
Update Presentation and Documentation
</commit_message>
<xml_diff>
--- a/Documents/Hydra.pptx
+++ b/Documents/Hydra.pptx
@@ -18686,7 +18686,7 @@
         </p:nvSpPr>
         <p:spPr>
           <a:xfrm>
-            <a:off x="1506736" y="3242648"/>
+            <a:off x="1585054" y="3242648"/>
             <a:ext cx="2462036" cy="1083600"/>
           </a:xfrm>
         </p:spPr>
@@ -18832,7 +18832,7 @@
         </p:nvSpPr>
         <p:spPr>
           <a:xfrm>
-            <a:off x="6146864" y="3229348"/>
+            <a:off x="6213976" y="3242648"/>
             <a:ext cx="2654893" cy="1516454"/>
           </a:xfrm>
         </p:spPr>
@@ -18905,7 +18905,7 @@
         </p:nvSpPr>
         <p:spPr>
           <a:xfrm>
-            <a:off x="8675400" y="3107406"/>
+            <a:off x="8675400" y="3242648"/>
             <a:ext cx="3364194" cy="1354084"/>
           </a:xfrm>
         </p:spPr>
@@ -18995,36 +18995,6 @@
       </p:grpSpPr>
       <p:pic>
         <p:nvPicPr>
-          <p:cNvPr id="10" name="Picture 9">
-            <a:extLst>
-              <a:ext uri="{FF2B5EF4-FFF2-40B4-BE49-F238E27FC236}">
-                <a16:creationId xmlns:a16="http://schemas.microsoft.com/office/drawing/2014/main" xmlns="" id="{65F0519C-63BA-9025-95AE-F286ECE50CF4}"/>
-              </a:ext>
-            </a:extLst>
-          </p:cNvPr>
-          <p:cNvPicPr>
-            <a:picLocks noChangeAspect="1"/>
-          </p:cNvPicPr>
-          <p:nvPr/>
-        </p:nvPicPr>
-        <p:blipFill>
-          <a:blip r:embed="rId2"/>
-          <a:stretch>
-            <a:fillRect/>
-          </a:stretch>
-        </p:blipFill>
-        <p:spPr>
-          <a:xfrm>
-            <a:off x="9918703" y="1823456"/>
-            <a:ext cx="2029956" cy="2047711"/>
-          </a:xfrm>
-          <a:prstGeom prst="rect">
-            <a:avLst/>
-          </a:prstGeom>
-        </p:spPr>
-      </p:pic>
-      <p:pic>
-        <p:nvPicPr>
           <p:cNvPr id="12" name="Picture 11">
             <a:extLst>
               <a:ext uri="{FF2B5EF4-FFF2-40B4-BE49-F238E27FC236}">
@@ -19038,7 +19008,7 @@
           <p:nvPr/>
         </p:nvPicPr>
         <p:blipFill>
-          <a:blip r:embed="rId3"/>
+          <a:blip r:embed="rId2"/>
           <a:stretch>
             <a:fillRect/>
           </a:stretch>
@@ -19068,7 +19038,7 @@
           <p:nvPr/>
         </p:nvPicPr>
         <p:blipFill>
-          <a:blip r:embed="rId4" cstate="print"/>
+          <a:blip r:embed="rId3"/>
           <a:stretch>
             <a:fillRect/>
           </a:stretch>
@@ -19098,7 +19068,7 @@
           <p:nvPr/>
         </p:nvPicPr>
         <p:blipFill>
-          <a:blip r:embed="rId5"/>
+          <a:blip r:embed="rId4"/>
           <a:stretch>
             <a:fillRect/>
           </a:stretch>
@@ -19720,6 +19690,36 @@
           </a:p>
         </p:txBody>
       </p:sp>
+      <p:pic>
+        <p:nvPicPr>
+          <p:cNvPr id="4" name="Picture 3">
+            <a:extLst>
+              <a:ext uri="{FF2B5EF4-FFF2-40B4-BE49-F238E27FC236}">
+                <a16:creationId xmlns:a16="http://schemas.microsoft.com/office/drawing/2014/main" xmlns="" id="{476DFC9A-57D0-937F-D126-6F9CB7C88EF2}"/>
+              </a:ext>
+            </a:extLst>
+          </p:cNvPr>
+          <p:cNvPicPr>
+            <a:picLocks noChangeAspect="1"/>
+          </p:cNvPicPr>
+          <p:nvPr/>
+        </p:nvPicPr>
+        <p:blipFill>
+          <a:blip r:embed="rId5"/>
+          <a:stretch>
+            <a:fillRect/>
+          </a:stretch>
+        </p:blipFill>
+        <p:spPr>
+          <a:xfrm>
+            <a:off x="10068802" y="1952388"/>
+            <a:ext cx="1554615" cy="1581574"/>
+          </a:xfrm>
+          <a:prstGeom prst="rect">
+            <a:avLst/>
+          </a:prstGeom>
+        </p:spPr>
+      </p:pic>
     </p:spTree>
     <p:extLst>
       <p:ext uri="{BB962C8B-B14F-4D97-AF65-F5344CB8AC3E}">
@@ -19782,7 +19782,7 @@
         </p:blipFill>
         <p:spPr bwMode="auto">
           <a:xfrm>
-            <a:off x="2460650" y="1889019"/>
+            <a:off x="2588807" y="1645738"/>
             <a:ext cx="7014386" cy="4461447"/>
           </a:xfrm>
           <a:prstGeom prst="rect">

</xml_diff>